<commit_message>
Problem Statement Case Studies
</commit_message>
<xml_diff>
--- a/3.2 Case Study One - Monalco Mining/Monalco Problem Statement Trent Leslie.pptx
+++ b/3.2 Case Study One - Monalco Mining/Monalco Problem Statement Trent Leslie.pptx
@@ -257,7 +257,7 @@
       </p15:sldGuideLst>
     </p:ext>
     <p:ext uri="http://customooxmlschemas.google.com/">
-      <go:slidesCustomData xmlns:go="http://customooxmlschemas.google.com/" xmlns:p15="http://schemas.microsoft.com/office/powerpoint/2012/main" xmlns:p14="http://schemas.microsoft.com/office/powerpoint/2010/main" xmlns:com="http://schemas.openxmlformats.org/drawingml/2006/compatibility" xmlns:pvml="urn:schemas-microsoft-com:office:powerpoint" xmlns:v="urn:schemas-microsoft-com:vml" xmlns:o="urn:schemas-microsoft-com:office:office" xmlns:dgm="http://schemas.openxmlformats.org/drawingml/2006/diagram" xmlns:c="http://schemas.openxmlformats.org/drawingml/2006/chart" xmlns:mv="urn:schemas-microsoft-com:mac:vml" xmlns:mc="http://schemas.openxmlformats.org/markup-compatibility/2006" xmlns="" r:id="rId7" roundtripDataSignature="AMtx7mjdo7FECp685JsX7/4pIVeoAktjNA=="/>
+      <go:slidesCustomData xmlns="" xmlns:mc="http://schemas.openxmlformats.org/markup-compatibility/2006" xmlns:mv="urn:schemas-microsoft-com:mac:vml" xmlns:c="http://schemas.openxmlformats.org/drawingml/2006/chart" xmlns:dgm="http://schemas.openxmlformats.org/drawingml/2006/diagram" xmlns:o="urn:schemas-microsoft-com:office:office" xmlns:v="urn:schemas-microsoft-com:vml" xmlns:pvml="urn:schemas-microsoft-com:office:powerpoint" xmlns:com="http://schemas.openxmlformats.org/drawingml/2006/compatibility" xmlns:p14="http://schemas.microsoft.com/office/powerpoint/2010/main" xmlns:p15="http://schemas.microsoft.com/office/powerpoint/2012/main" xmlns:go="http://customooxmlschemas.google.com/" r:id="rId7" roundtripDataSignature="AMtx7mjdo7FECp685JsX7/4pIVeoAktjNA=="/>
     </p:ext>
   </p:extLst>
 </p:presentation>
@@ -5986,7 +5986,31 @@
                 <a:cs typeface="Arial"/>
                 <a:sym typeface="Arial"/>
               </a:rPr>
-              <a:t> Mining to reduce ore-crusher maintenance costs by 20% (from $45M to $36M in 2020?</a:t>
+              <a:t> Mining to reduce ore-crusher maintenance costs by 20% (from $45M to </a:t>
+            </a:r>
+            <a:r>
+              <a:rPr lang="en-AU" sz="1400" b="1" i="0" u="none" strike="noStrike" cap="none">
+                <a:solidFill>
+                  <a:srgbClr val="000000"/>
+                </a:solidFill>
+                <a:latin typeface="Arial"/>
+                <a:ea typeface="Arial"/>
+                <a:cs typeface="Arial"/>
+                <a:sym typeface="Arial"/>
+              </a:rPr>
+              <a:t>$36M) </a:t>
+            </a:r>
+            <a:r>
+              <a:rPr lang="en-AU" sz="1400" b="1" i="0" u="none" strike="noStrike" cap="none" dirty="0">
+                <a:solidFill>
+                  <a:srgbClr val="000000"/>
+                </a:solidFill>
+                <a:latin typeface="Arial"/>
+                <a:ea typeface="Arial"/>
+                <a:cs typeface="Arial"/>
+                <a:sym typeface="Arial"/>
+              </a:rPr>
+              <a:t>in 2020?</a:t>
             </a:r>
             <a:endParaRPr sz="1400" b="1" i="0" u="none" strike="noStrike" cap="none" dirty="0">
               <a:solidFill>

</xml_diff>